<commit_message>
improve readabiliy, run multiple calls at once
</commit_message>
<xml_diff>
--- a/code/basis regions.pptx
+++ b/code/basis regions.pptx
@@ -105,6 +105,11 @@
       </a:defRPr>
     </a:lvl9pPr>
   </p:defaultTextStyle>
+  <p:extLst>
+    <p:ext uri="{EFAFB233-063F-42B5-8137-9DF3F51BA10A}">
+      <p15:sldGuideLst xmlns:p15="http://schemas.microsoft.com/office/powerpoint/2012/main"/>
+    </p:ext>
+  </p:extLst>
 </p:presentation>
 </file>
 
@@ -3336,7 +3341,7 @@
         </p:nvGrpSpPr>
         <p:grpSpPr>
           <a:xfrm>
-            <a:off x="652357" y="0"/>
+            <a:off x="671407" y="0"/>
             <a:ext cx="10463512" cy="7001590"/>
             <a:chOff x="652357" y="0"/>
             <a:chExt cx="10463512" cy="7001590"/>
@@ -3551,42 +3556,764 @@
           <a:chExt cx="0" cy="0"/>
         </a:xfrm>
       </p:grpSpPr>
-      <p:pic>
-        <p:nvPicPr>
-          <p:cNvPr id="4" name="Picture 3" descr="Map&#10;&#10;Description automatically generated">
-            <a:extLst>
-              <a:ext uri="{FF2B5EF4-FFF2-40B4-BE49-F238E27FC236}">
-                <a16:creationId xmlns:a16="http://schemas.microsoft.com/office/drawing/2014/main" id="{87B1F049-4C04-4D6B-98B9-327AF4DC2802}"/>
-              </a:ext>
-            </a:extLst>
-          </p:cNvPr>
-          <p:cNvPicPr>
-            <a:picLocks noChangeAspect="1"/>
-          </p:cNvPicPr>
+      <p:grpSp>
+        <p:nvGrpSpPr>
+          <p:cNvPr id="45" name="Group 44">
+            <a:extLst>
+              <a:ext uri="{FF2B5EF4-FFF2-40B4-BE49-F238E27FC236}">
+                <a16:creationId xmlns:a16="http://schemas.microsoft.com/office/drawing/2014/main" id="{EAC78B9A-24B9-4BBB-8372-5728A96295C4}"/>
+              </a:ext>
+            </a:extLst>
+          </p:cNvPr>
+          <p:cNvGrpSpPr>
+            <a:grpSpLocks noChangeAspect="1"/>
+          </p:cNvGrpSpPr>
           <p:nvPr/>
-        </p:nvPicPr>
-        <p:blipFill>
-          <a:blip r:embed="rId2">
-            <a:extLst>
-              <a:ext uri="{28A0092B-C50C-407E-A947-70E740481C1C}">
-                <a14:useLocalDpi xmlns:a14="http://schemas.microsoft.com/office/drawing/2010/main" val="0"/>
-              </a:ext>
-            </a:extLst>
-          </a:blip>
-          <a:stretch>
-            <a:fillRect/>
-          </a:stretch>
-        </p:blipFill>
-        <p:spPr>
+        </p:nvGrpSpPr>
+        <p:grpSpPr>
           <a:xfrm>
-            <a:off x="0" y="42333"/>
-            <a:ext cx="12192000" cy="6773333"/>
+            <a:off x="96936" y="0"/>
+            <a:ext cx="11998127" cy="6858000"/>
+            <a:chOff x="0" y="0"/>
+            <a:chExt cx="12192000" cy="6288268"/>
           </a:xfrm>
-          <a:prstGeom prst="rect">
-            <a:avLst/>
-          </a:prstGeom>
-        </p:spPr>
-      </p:pic>
+        </p:grpSpPr>
+        <p:pic>
+          <p:nvPicPr>
+            <p:cNvPr id="4" name="Picture 3" descr="Map&#10;&#10;Description automatically generated">
+              <a:extLst>
+                <a:ext uri="{FF2B5EF4-FFF2-40B4-BE49-F238E27FC236}">
+                  <a16:creationId xmlns:a16="http://schemas.microsoft.com/office/drawing/2014/main" id="{87B1F049-4C04-4D6B-98B9-327AF4DC2802}"/>
+                </a:ext>
+              </a:extLst>
+            </p:cNvPr>
+            <p:cNvPicPr>
+              <a:picLocks noChangeAspect="1"/>
+            </p:cNvPicPr>
+            <p:nvPr/>
+          </p:nvPicPr>
+          <p:blipFill rotWithShape="1">
+            <a:blip r:embed="rId2">
+              <a:extLst>
+                <a:ext uri="{28A0092B-C50C-407E-A947-70E740481C1C}">
+                  <a14:useLocalDpi xmlns:a14="http://schemas.microsoft.com/office/drawing/2010/main" val="0"/>
+                </a:ext>
+              </a:extLst>
+            </a:blip>
+            <a:srcRect l="9223" t="22259" r="25275" b="16929"/>
+            <a:stretch/>
+          </p:blipFill>
+          <p:spPr>
+            <a:xfrm>
+              <a:off x="0" y="0"/>
+              <a:ext cx="12192000" cy="6288268"/>
+            </a:xfrm>
+            <a:prstGeom prst="rect">
+              <a:avLst/>
+            </a:prstGeom>
+          </p:spPr>
+        </p:pic>
+        <p:sp>
+          <p:nvSpPr>
+            <p:cNvPr id="19" name="TextBox 18">
+              <a:extLst>
+                <a:ext uri="{FF2B5EF4-FFF2-40B4-BE49-F238E27FC236}">
+                  <a16:creationId xmlns:a16="http://schemas.microsoft.com/office/drawing/2014/main" id="{106A07F0-B46A-4B15-A7D7-9C5904DB5A2D}"/>
+                </a:ext>
+              </a:extLst>
+            </p:cNvPr>
+            <p:cNvSpPr txBox="1"/>
+            <p:nvPr/>
+          </p:nvSpPr>
+          <p:spPr>
+            <a:xfrm>
+              <a:off x="2392039" y="797321"/>
+              <a:ext cx="977170" cy="307777"/>
+            </a:xfrm>
+            <a:prstGeom prst="rect">
+              <a:avLst/>
+            </a:prstGeom>
+            <a:noFill/>
+          </p:spPr>
+          <p:style>
+            <a:lnRef idx="2">
+              <a:schemeClr val="dk1"/>
+            </a:lnRef>
+            <a:fillRef idx="1">
+              <a:schemeClr val="lt1"/>
+            </a:fillRef>
+            <a:effectRef idx="0">
+              <a:schemeClr val="dk1"/>
+            </a:effectRef>
+            <a:fontRef idx="minor">
+              <a:schemeClr val="dk1"/>
+            </a:fontRef>
+          </p:style>
+          <p:txBody>
+            <a:bodyPr wrap="square" rtlCol="0">
+              <a:spAutoFit/>
+            </a:bodyPr>
+            <a:lstStyle/>
+            <a:p>
+              <a:pPr algn="ctr"/>
+              <a:r>
+                <a:rPr lang="en-US" sz="1400" b="1" dirty="0"/>
+                <a:t>1-BONA</a:t>
+              </a:r>
+            </a:p>
+          </p:txBody>
+        </p:sp>
+        <p:sp>
+          <p:nvSpPr>
+            <p:cNvPr id="20" name="TextBox 19">
+              <a:extLst>
+                <a:ext uri="{FF2B5EF4-FFF2-40B4-BE49-F238E27FC236}">
+                  <a16:creationId xmlns:a16="http://schemas.microsoft.com/office/drawing/2014/main" id="{F3E133EA-89C5-495E-98FB-817A9D82C4A7}"/>
+                </a:ext>
+              </a:extLst>
+            </p:cNvPr>
+            <p:cNvSpPr txBox="1"/>
+            <p:nvPr/>
+          </p:nvSpPr>
+          <p:spPr>
+            <a:xfrm>
+              <a:off x="2677433" y="1478232"/>
+              <a:ext cx="917005" cy="307777"/>
+            </a:xfrm>
+            <a:prstGeom prst="rect">
+              <a:avLst/>
+            </a:prstGeom>
+            <a:noFill/>
+          </p:spPr>
+          <p:style>
+            <a:lnRef idx="2">
+              <a:schemeClr val="dk1"/>
+            </a:lnRef>
+            <a:fillRef idx="1">
+              <a:schemeClr val="lt1"/>
+            </a:fillRef>
+            <a:effectRef idx="0">
+              <a:schemeClr val="dk1"/>
+            </a:effectRef>
+            <a:fontRef idx="minor">
+              <a:schemeClr val="dk1"/>
+            </a:fontRef>
+          </p:style>
+          <p:txBody>
+            <a:bodyPr wrap="square" rtlCol="0">
+              <a:spAutoFit/>
+            </a:bodyPr>
+            <a:lstStyle/>
+            <a:p>
+              <a:pPr algn="ctr"/>
+              <a:r>
+                <a:rPr lang="en-US" sz="1400" b="1" dirty="0"/>
+                <a:t>2-TENA</a:t>
+              </a:r>
+            </a:p>
+          </p:txBody>
+        </p:sp>
+        <p:sp>
+          <p:nvSpPr>
+            <p:cNvPr id="21" name="TextBox 20">
+              <a:extLst>
+                <a:ext uri="{FF2B5EF4-FFF2-40B4-BE49-F238E27FC236}">
+                  <a16:creationId xmlns:a16="http://schemas.microsoft.com/office/drawing/2014/main" id="{54906A7A-9490-451E-9D68-37C3DC0B62BF}"/>
+                </a:ext>
+              </a:extLst>
+            </p:cNvPr>
+            <p:cNvSpPr txBox="1"/>
+            <p:nvPr/>
+          </p:nvSpPr>
+          <p:spPr>
+            <a:xfrm>
+              <a:off x="3135935" y="2147722"/>
+              <a:ext cx="917005" cy="307777"/>
+            </a:xfrm>
+            <a:prstGeom prst="rect">
+              <a:avLst/>
+            </a:prstGeom>
+            <a:noFill/>
+          </p:spPr>
+          <p:style>
+            <a:lnRef idx="2">
+              <a:schemeClr val="dk1"/>
+            </a:lnRef>
+            <a:fillRef idx="1">
+              <a:schemeClr val="lt1"/>
+            </a:fillRef>
+            <a:effectRef idx="0">
+              <a:schemeClr val="dk1"/>
+            </a:effectRef>
+            <a:fontRef idx="minor">
+              <a:schemeClr val="dk1"/>
+            </a:fontRef>
+          </p:style>
+          <p:txBody>
+            <a:bodyPr wrap="square" rtlCol="0">
+              <a:spAutoFit/>
+            </a:bodyPr>
+            <a:lstStyle/>
+            <a:p>
+              <a:pPr algn="ctr"/>
+              <a:r>
+                <a:rPr lang="en-US" sz="1400" b="1" dirty="0"/>
+                <a:t>3-CEAM</a:t>
+              </a:r>
+            </a:p>
+          </p:txBody>
+        </p:sp>
+        <p:sp>
+          <p:nvSpPr>
+            <p:cNvPr id="22" name="TextBox 21">
+              <a:extLst>
+                <a:ext uri="{FF2B5EF4-FFF2-40B4-BE49-F238E27FC236}">
+                  <a16:creationId xmlns:a16="http://schemas.microsoft.com/office/drawing/2014/main" id="{517512E1-6BE4-401B-AB0F-587DCF43EE10}"/>
+                </a:ext>
+              </a:extLst>
+            </p:cNvPr>
+            <p:cNvSpPr txBox="1"/>
+            <p:nvPr/>
+          </p:nvSpPr>
+          <p:spPr>
+            <a:xfrm>
+              <a:off x="3887418" y="2588639"/>
+              <a:ext cx="917005" cy="307777"/>
+            </a:xfrm>
+            <a:prstGeom prst="rect">
+              <a:avLst/>
+            </a:prstGeom>
+            <a:noFill/>
+          </p:spPr>
+          <p:style>
+            <a:lnRef idx="2">
+              <a:schemeClr val="dk1"/>
+            </a:lnRef>
+            <a:fillRef idx="1">
+              <a:schemeClr val="lt1"/>
+            </a:fillRef>
+            <a:effectRef idx="0">
+              <a:schemeClr val="dk1"/>
+            </a:effectRef>
+            <a:fontRef idx="minor">
+              <a:schemeClr val="dk1"/>
+            </a:fontRef>
+          </p:style>
+          <p:txBody>
+            <a:bodyPr wrap="square" rtlCol="0">
+              <a:spAutoFit/>
+            </a:bodyPr>
+            <a:lstStyle/>
+            <a:p>
+              <a:pPr algn="ctr"/>
+              <a:r>
+                <a:rPr lang="en-US" sz="1400" b="1" dirty="0"/>
+                <a:t>4-NHSA</a:t>
+              </a:r>
+            </a:p>
+          </p:txBody>
+        </p:sp>
+        <p:sp>
+          <p:nvSpPr>
+            <p:cNvPr id="23" name="TextBox 22">
+              <a:extLst>
+                <a:ext uri="{FF2B5EF4-FFF2-40B4-BE49-F238E27FC236}">
+                  <a16:creationId xmlns:a16="http://schemas.microsoft.com/office/drawing/2014/main" id="{731654D9-EE4B-46FB-92C8-44EEA2697489}"/>
+                </a:ext>
+              </a:extLst>
+            </p:cNvPr>
+            <p:cNvSpPr txBox="1"/>
+            <p:nvPr/>
+          </p:nvSpPr>
+          <p:spPr>
+            <a:xfrm>
+              <a:off x="4139747" y="3294621"/>
+              <a:ext cx="917005" cy="307777"/>
+            </a:xfrm>
+            <a:prstGeom prst="rect">
+              <a:avLst/>
+            </a:prstGeom>
+            <a:noFill/>
+          </p:spPr>
+          <p:style>
+            <a:lnRef idx="2">
+              <a:schemeClr val="dk1"/>
+            </a:lnRef>
+            <a:fillRef idx="1">
+              <a:schemeClr val="lt1"/>
+            </a:fillRef>
+            <a:effectRef idx="0">
+              <a:schemeClr val="dk1"/>
+            </a:effectRef>
+            <a:fontRef idx="minor">
+              <a:schemeClr val="dk1"/>
+            </a:fontRef>
+          </p:style>
+          <p:txBody>
+            <a:bodyPr wrap="square" rtlCol="0">
+              <a:spAutoFit/>
+            </a:bodyPr>
+            <a:lstStyle/>
+            <a:p>
+              <a:pPr algn="ctr"/>
+              <a:r>
+                <a:rPr lang="en-US" sz="1400" b="1" dirty="0"/>
+                <a:t>5-SHSA</a:t>
+              </a:r>
+            </a:p>
+          </p:txBody>
+        </p:sp>
+        <p:sp>
+          <p:nvSpPr>
+            <p:cNvPr id="24" name="TextBox 23">
+              <a:extLst>
+                <a:ext uri="{FF2B5EF4-FFF2-40B4-BE49-F238E27FC236}">
+                  <a16:creationId xmlns:a16="http://schemas.microsoft.com/office/drawing/2014/main" id="{9F4018A2-0E76-4A39-B3FA-46198E2C332D}"/>
+                </a:ext>
+              </a:extLst>
+            </p:cNvPr>
+            <p:cNvSpPr txBox="1"/>
+            <p:nvPr/>
+          </p:nvSpPr>
+          <p:spPr>
+            <a:xfrm>
+              <a:off x="5479909" y="774805"/>
+              <a:ext cx="917005" cy="307777"/>
+            </a:xfrm>
+            <a:prstGeom prst="rect">
+              <a:avLst/>
+            </a:prstGeom>
+            <a:noFill/>
+          </p:spPr>
+          <p:style>
+            <a:lnRef idx="2">
+              <a:schemeClr val="dk1"/>
+            </a:lnRef>
+            <a:fillRef idx="1">
+              <a:schemeClr val="lt1"/>
+            </a:fillRef>
+            <a:effectRef idx="0">
+              <a:schemeClr val="dk1"/>
+            </a:effectRef>
+            <a:fontRef idx="minor">
+              <a:schemeClr val="dk1"/>
+            </a:fontRef>
+          </p:style>
+          <p:txBody>
+            <a:bodyPr wrap="square" rtlCol="0">
+              <a:spAutoFit/>
+            </a:bodyPr>
+            <a:lstStyle/>
+            <a:p>
+              <a:pPr algn="ctr"/>
+              <a:r>
+                <a:rPr lang="en-US" sz="1400" b="1" dirty="0"/>
+                <a:t>6-EURO</a:t>
+              </a:r>
+            </a:p>
+          </p:txBody>
+        </p:sp>
+        <p:sp>
+          <p:nvSpPr>
+            <p:cNvPr id="25" name="TextBox 24">
+              <a:extLst>
+                <a:ext uri="{FF2B5EF4-FFF2-40B4-BE49-F238E27FC236}">
+                  <a16:creationId xmlns:a16="http://schemas.microsoft.com/office/drawing/2014/main" id="{ECE1D94A-011E-49F4-9E3E-B1EC4FB6F9FE}"/>
+                </a:ext>
+              </a:extLst>
+            </p:cNvPr>
+            <p:cNvSpPr txBox="1"/>
+            <p:nvPr/>
+          </p:nvSpPr>
+          <p:spPr>
+            <a:xfrm>
+              <a:off x="6760873" y="1743707"/>
+              <a:ext cx="917005" cy="307777"/>
+            </a:xfrm>
+            <a:prstGeom prst="rect">
+              <a:avLst/>
+            </a:prstGeom>
+            <a:noFill/>
+          </p:spPr>
+          <p:style>
+            <a:lnRef idx="2">
+              <a:schemeClr val="dk1"/>
+            </a:lnRef>
+            <a:fillRef idx="1">
+              <a:schemeClr val="lt1"/>
+            </a:fillRef>
+            <a:effectRef idx="0">
+              <a:schemeClr val="dk1"/>
+            </a:effectRef>
+            <a:fontRef idx="minor">
+              <a:schemeClr val="dk1"/>
+            </a:fontRef>
+          </p:style>
+          <p:txBody>
+            <a:bodyPr wrap="square" rtlCol="0">
+              <a:spAutoFit/>
+            </a:bodyPr>
+            <a:lstStyle/>
+            <a:p>
+              <a:pPr algn="ctr"/>
+              <a:r>
+                <a:rPr lang="en-US" sz="1400" b="1" dirty="0"/>
+                <a:t>7-MIDE</a:t>
+              </a:r>
+            </a:p>
+          </p:txBody>
+        </p:sp>
+        <p:sp>
+          <p:nvSpPr>
+            <p:cNvPr id="26" name="TextBox 25">
+              <a:extLst>
+                <a:ext uri="{FF2B5EF4-FFF2-40B4-BE49-F238E27FC236}">
+                  <a16:creationId xmlns:a16="http://schemas.microsoft.com/office/drawing/2014/main" id="{0FF739AE-493E-4B50-B1BF-E5F94B73873C}"/>
+                </a:ext>
+              </a:extLst>
+            </p:cNvPr>
+            <p:cNvSpPr txBox="1"/>
+            <p:nvPr/>
+          </p:nvSpPr>
+          <p:spPr>
+            <a:xfrm>
+              <a:off x="6587210" y="2368076"/>
+              <a:ext cx="917005" cy="307777"/>
+            </a:xfrm>
+            <a:prstGeom prst="rect">
+              <a:avLst/>
+            </a:prstGeom>
+            <a:noFill/>
+          </p:spPr>
+          <p:style>
+            <a:lnRef idx="2">
+              <a:schemeClr val="dk1"/>
+            </a:lnRef>
+            <a:fillRef idx="1">
+              <a:schemeClr val="lt1"/>
+            </a:fillRef>
+            <a:effectRef idx="0">
+              <a:schemeClr val="dk1"/>
+            </a:effectRef>
+            <a:fontRef idx="minor">
+              <a:schemeClr val="dk1"/>
+            </a:fontRef>
+          </p:style>
+          <p:txBody>
+            <a:bodyPr wrap="square" rtlCol="0">
+              <a:spAutoFit/>
+            </a:bodyPr>
+            <a:lstStyle/>
+            <a:p>
+              <a:pPr algn="ctr"/>
+              <a:r>
+                <a:rPr lang="en-US" sz="1400" b="1" dirty="0"/>
+                <a:t>8-NHAF</a:t>
+              </a:r>
+            </a:p>
+          </p:txBody>
+        </p:sp>
+        <p:sp>
+          <p:nvSpPr>
+            <p:cNvPr id="27" name="TextBox 26">
+              <a:extLst>
+                <a:ext uri="{FF2B5EF4-FFF2-40B4-BE49-F238E27FC236}">
+                  <a16:creationId xmlns:a16="http://schemas.microsoft.com/office/drawing/2014/main" id="{CE4BCD79-8323-408A-BECE-E06CE014E015}"/>
+                </a:ext>
+              </a:extLst>
+            </p:cNvPr>
+            <p:cNvSpPr txBox="1"/>
+            <p:nvPr/>
+          </p:nvSpPr>
+          <p:spPr>
+            <a:xfrm>
+              <a:off x="6866556" y="3167467"/>
+              <a:ext cx="917005" cy="307777"/>
+            </a:xfrm>
+            <a:prstGeom prst="rect">
+              <a:avLst/>
+            </a:prstGeom>
+            <a:noFill/>
+          </p:spPr>
+          <p:style>
+            <a:lnRef idx="2">
+              <a:schemeClr val="dk1"/>
+            </a:lnRef>
+            <a:fillRef idx="1">
+              <a:schemeClr val="lt1"/>
+            </a:fillRef>
+            <a:effectRef idx="0">
+              <a:schemeClr val="dk1"/>
+            </a:effectRef>
+            <a:fontRef idx="minor">
+              <a:schemeClr val="dk1"/>
+            </a:fontRef>
+          </p:style>
+          <p:txBody>
+            <a:bodyPr wrap="square" rtlCol="0">
+              <a:spAutoFit/>
+            </a:bodyPr>
+            <a:lstStyle/>
+            <a:p>
+              <a:pPr algn="ctr"/>
+              <a:r>
+                <a:rPr lang="en-US" sz="1400" b="1" dirty="0"/>
+                <a:t>9-SHAF</a:t>
+              </a:r>
+            </a:p>
+          </p:txBody>
+        </p:sp>
+        <p:sp>
+          <p:nvSpPr>
+            <p:cNvPr id="28" name="TextBox 27">
+              <a:extLst>
+                <a:ext uri="{FF2B5EF4-FFF2-40B4-BE49-F238E27FC236}">
+                  <a16:creationId xmlns:a16="http://schemas.microsoft.com/office/drawing/2014/main" id="{11B8727C-786F-4FF5-BFF8-707ED20C5225}"/>
+                </a:ext>
+              </a:extLst>
+            </p:cNvPr>
+            <p:cNvSpPr txBox="1"/>
+            <p:nvPr/>
+          </p:nvSpPr>
+          <p:spPr>
+            <a:xfrm>
+              <a:off x="8996200" y="688850"/>
+              <a:ext cx="1115234" cy="307777"/>
+            </a:xfrm>
+            <a:prstGeom prst="rect">
+              <a:avLst/>
+            </a:prstGeom>
+            <a:noFill/>
+          </p:spPr>
+          <p:style>
+            <a:lnRef idx="2">
+              <a:schemeClr val="dk1"/>
+            </a:lnRef>
+            <a:fillRef idx="1">
+              <a:schemeClr val="lt1"/>
+            </a:fillRef>
+            <a:effectRef idx="0">
+              <a:schemeClr val="dk1"/>
+            </a:effectRef>
+            <a:fontRef idx="minor">
+              <a:schemeClr val="dk1"/>
+            </a:fontRef>
+          </p:style>
+          <p:txBody>
+            <a:bodyPr wrap="square" rtlCol="0">
+              <a:spAutoFit/>
+            </a:bodyPr>
+            <a:lstStyle/>
+            <a:p>
+              <a:pPr algn="ctr"/>
+              <a:r>
+                <a:rPr lang="en-US" sz="1400" b="1" dirty="0"/>
+                <a:t>10-BOAS</a:t>
+              </a:r>
+            </a:p>
+          </p:txBody>
+        </p:sp>
+        <p:sp>
+          <p:nvSpPr>
+            <p:cNvPr id="29" name="TextBox 28">
+              <a:extLst>
+                <a:ext uri="{FF2B5EF4-FFF2-40B4-BE49-F238E27FC236}">
+                  <a16:creationId xmlns:a16="http://schemas.microsoft.com/office/drawing/2014/main" id="{9B3C3AF0-BAB6-44CE-8DF5-88A736AD670B}"/>
+                </a:ext>
+              </a:extLst>
+            </p:cNvPr>
+            <p:cNvSpPr txBox="1"/>
+            <p:nvPr/>
+          </p:nvSpPr>
+          <p:spPr>
+            <a:xfrm>
+              <a:off x="8565337" y="1344328"/>
+              <a:ext cx="977170" cy="307777"/>
+            </a:xfrm>
+            <a:prstGeom prst="rect">
+              <a:avLst/>
+            </a:prstGeom>
+            <a:noFill/>
+          </p:spPr>
+          <p:style>
+            <a:lnRef idx="2">
+              <a:schemeClr val="dk1"/>
+            </a:lnRef>
+            <a:fillRef idx="1">
+              <a:schemeClr val="lt1"/>
+            </a:fillRef>
+            <a:effectRef idx="0">
+              <a:schemeClr val="dk1"/>
+            </a:effectRef>
+            <a:fontRef idx="minor">
+              <a:schemeClr val="dk1"/>
+            </a:fontRef>
+          </p:style>
+          <p:txBody>
+            <a:bodyPr wrap="square" rtlCol="0">
+              <a:spAutoFit/>
+            </a:bodyPr>
+            <a:lstStyle/>
+            <a:p>
+              <a:pPr algn="ctr"/>
+              <a:r>
+                <a:rPr lang="en-US" sz="1400" b="1" dirty="0"/>
+                <a:t>11-CEAS</a:t>
+              </a:r>
+            </a:p>
+          </p:txBody>
+        </p:sp>
+        <p:sp>
+          <p:nvSpPr>
+            <p:cNvPr id="30" name="TextBox 29">
+              <a:extLst>
+                <a:ext uri="{FF2B5EF4-FFF2-40B4-BE49-F238E27FC236}">
+                  <a16:creationId xmlns:a16="http://schemas.microsoft.com/office/drawing/2014/main" id="{6400FD56-D324-40AA-8F25-997432E6E8DF}"/>
+                </a:ext>
+              </a:extLst>
+            </p:cNvPr>
+            <p:cNvSpPr txBox="1"/>
+            <p:nvPr/>
+          </p:nvSpPr>
+          <p:spPr>
+            <a:xfrm>
+              <a:off x="8576647" y="2109155"/>
+              <a:ext cx="977170" cy="307777"/>
+            </a:xfrm>
+            <a:prstGeom prst="rect">
+              <a:avLst/>
+            </a:prstGeom>
+            <a:noFill/>
+          </p:spPr>
+          <p:style>
+            <a:lnRef idx="2">
+              <a:schemeClr val="dk1"/>
+            </a:lnRef>
+            <a:fillRef idx="1">
+              <a:schemeClr val="lt1"/>
+            </a:fillRef>
+            <a:effectRef idx="0">
+              <a:schemeClr val="dk1"/>
+            </a:effectRef>
+            <a:fontRef idx="minor">
+              <a:schemeClr val="dk1"/>
+            </a:fontRef>
+          </p:style>
+          <p:txBody>
+            <a:bodyPr wrap="square" rtlCol="0">
+              <a:spAutoFit/>
+            </a:bodyPr>
+            <a:lstStyle/>
+            <a:p>
+              <a:pPr algn="ctr"/>
+              <a:r>
+                <a:rPr lang="en-US" sz="1400" b="1" dirty="0"/>
+                <a:t>12-SEAS</a:t>
+              </a:r>
+            </a:p>
+          </p:txBody>
+        </p:sp>
+        <p:sp>
+          <p:nvSpPr>
+            <p:cNvPr id="31" name="TextBox 30">
+              <a:extLst>
+                <a:ext uri="{FF2B5EF4-FFF2-40B4-BE49-F238E27FC236}">
+                  <a16:creationId xmlns:a16="http://schemas.microsoft.com/office/drawing/2014/main" id="{308205D2-B114-47BA-A02C-C7ED19B48BF2}"/>
+                </a:ext>
+              </a:extLst>
+            </p:cNvPr>
+            <p:cNvSpPr txBox="1"/>
+            <p:nvPr/>
+          </p:nvSpPr>
+          <p:spPr>
+            <a:xfrm>
+              <a:off x="9894491" y="2770575"/>
+              <a:ext cx="977170" cy="307777"/>
+            </a:xfrm>
+            <a:prstGeom prst="rect">
+              <a:avLst/>
+            </a:prstGeom>
+            <a:noFill/>
+          </p:spPr>
+          <p:style>
+            <a:lnRef idx="2">
+              <a:schemeClr val="dk1"/>
+            </a:lnRef>
+            <a:fillRef idx="1">
+              <a:schemeClr val="lt1"/>
+            </a:fillRef>
+            <a:effectRef idx="0">
+              <a:schemeClr val="dk1"/>
+            </a:effectRef>
+            <a:fontRef idx="minor">
+              <a:schemeClr val="dk1"/>
+            </a:fontRef>
+          </p:style>
+          <p:txBody>
+            <a:bodyPr wrap="square" rtlCol="0">
+              <a:spAutoFit/>
+            </a:bodyPr>
+            <a:lstStyle/>
+            <a:p>
+              <a:pPr algn="ctr"/>
+              <a:r>
+                <a:rPr lang="en-US" sz="1400" b="1" dirty="0"/>
+                <a:t>13-EQAS</a:t>
+              </a:r>
+            </a:p>
+          </p:txBody>
+        </p:sp>
+        <p:sp>
+          <p:nvSpPr>
+            <p:cNvPr id="32" name="TextBox 31">
+              <a:extLst>
+                <a:ext uri="{FF2B5EF4-FFF2-40B4-BE49-F238E27FC236}">
+                  <a16:creationId xmlns:a16="http://schemas.microsoft.com/office/drawing/2014/main" id="{BFE77331-A4FD-4305-89E5-4BA33E624794}"/>
+                </a:ext>
+              </a:extLst>
+            </p:cNvPr>
+            <p:cNvSpPr txBox="1"/>
+            <p:nvPr/>
+          </p:nvSpPr>
+          <p:spPr>
+            <a:xfrm>
+              <a:off x="10329439" y="3589465"/>
+              <a:ext cx="977170" cy="307777"/>
+            </a:xfrm>
+            <a:prstGeom prst="rect">
+              <a:avLst/>
+            </a:prstGeom>
+            <a:noFill/>
+          </p:spPr>
+          <p:style>
+            <a:lnRef idx="2">
+              <a:schemeClr val="dk1"/>
+            </a:lnRef>
+            <a:fillRef idx="1">
+              <a:schemeClr val="lt1"/>
+            </a:fillRef>
+            <a:effectRef idx="0">
+              <a:schemeClr val="dk1"/>
+            </a:effectRef>
+            <a:fontRef idx="minor">
+              <a:schemeClr val="dk1"/>
+            </a:fontRef>
+          </p:style>
+          <p:txBody>
+            <a:bodyPr wrap="square" rtlCol="0">
+              <a:spAutoFit/>
+            </a:bodyPr>
+            <a:lstStyle/>
+            <a:p>
+              <a:pPr algn="ctr"/>
+              <a:r>
+                <a:rPr lang="en-US" sz="1400" b="1" dirty="0"/>
+                <a:t>14-AUST</a:t>
+              </a:r>
+            </a:p>
+          </p:txBody>
+        </p:sp>
+      </p:grpSp>
     </p:spTree>
     <p:extLst>
       <p:ext uri="{BB962C8B-B14F-4D97-AF65-F5344CB8AC3E}">

</xml_diff>